<commit_message>
Update 06.0 -- 服务 ------- 第06章.pptx
</commit_message>
<xml_diff>
--- a/06.0 -- 服务 ------- 第06章.pptx
+++ b/06.0 -- 服务 ------- 第06章.pptx
@@ -331,7 +331,7 @@
               <a:pPr>
                 <a:defRPr/>
               </a:pPr>
-              <a:t>2020/10/25</a:t>
+              <a:t>2020/11/16</a:t>
             </a:fld>
             <a:endParaRPr lang="zh-CN" altLang="en-US" sz="1200"/>
           </a:p>
@@ -1376,7 +1376,7 @@
             <a:fld id="{C33D8BF3-04B1-4578-9944-A784348B543C}" type="datetimeFigureOut">
               <a:rPr lang="zh-CN" altLang="en-US"/>
               <a:pPr/>
-              <a:t>2020/10/25</a:t>
+              <a:t>2020/11/16</a:t>
             </a:fld>
             <a:endParaRPr lang="zh-CN" altLang="en-US"/>
           </a:p>
@@ -1575,7 +1575,7 @@
             <a:fld id="{C33D8BF3-04B1-4578-9944-A784348B543C}" type="datetimeFigureOut">
               <a:rPr lang="zh-CN" altLang="en-US"/>
               <a:pPr/>
-              <a:t>2020/10/25</a:t>
+              <a:t>2020/11/16</a:t>
             </a:fld>
             <a:endParaRPr lang="zh-CN" altLang="en-US"/>
           </a:p>
@@ -1724,7 +1724,7 @@
             <a:fld id="{C33D8BF3-04B1-4578-9944-A784348B543C}" type="datetimeFigureOut">
               <a:rPr lang="zh-CN" altLang="en-US"/>
               <a:pPr/>
-              <a:t>2020/10/25</a:t>
+              <a:t>2020/11/16</a:t>
             </a:fld>
             <a:endParaRPr lang="zh-CN" altLang="en-US"/>
           </a:p>
@@ -1873,7 +1873,7 @@
             <a:fld id="{C33D8BF3-04B1-4578-9944-A784348B543C}" type="datetimeFigureOut">
               <a:rPr lang="zh-CN" altLang="en-US"/>
               <a:pPr/>
-              <a:t>2020/10/25</a:t>
+              <a:t>2020/11/16</a:t>
             </a:fld>
             <a:endParaRPr lang="zh-CN" altLang="en-US"/>
           </a:p>
@@ -2075,7 +2075,7 @@
             <a:fld id="{C33D8BF3-04B1-4578-9944-A784348B543C}" type="datetimeFigureOut">
               <a:rPr lang="zh-CN" altLang="en-US"/>
               <a:pPr/>
-              <a:t>2020/10/25</a:t>
+              <a:t>2020/11/16</a:t>
             </a:fld>
             <a:endParaRPr lang="zh-CN" altLang="en-US"/>
           </a:p>
@@ -2464,7 +2464,7 @@
             <a:fld id="{C33D8BF3-04B1-4578-9944-A784348B543C}" type="datetimeFigureOut">
               <a:rPr lang="zh-CN" altLang="en-US"/>
               <a:pPr/>
-              <a:t>2020/10/25</a:t>
+              <a:t>2020/11/16</a:t>
             </a:fld>
             <a:endParaRPr lang="zh-CN" altLang="en-US"/>
           </a:p>
@@ -2732,7 +2732,7 @@
             <a:fld id="{C33D8BF3-04B1-4578-9944-A784348B543C}" type="datetimeFigureOut">
               <a:rPr lang="zh-CN" altLang="en-US"/>
               <a:pPr/>
-              <a:t>2020/10/25</a:t>
+              <a:t>2020/11/16</a:t>
             </a:fld>
             <a:endParaRPr lang="zh-CN" altLang="en-US"/>
           </a:p>
@@ -3135,7 +3135,7 @@
             <a:fld id="{C33D8BF3-04B1-4578-9944-A784348B543C}" type="datetimeFigureOut">
               <a:rPr lang="zh-CN" altLang="en-US"/>
               <a:pPr/>
-              <a:t>2020/10/25</a:t>
+              <a:t>2020/11/16</a:t>
             </a:fld>
             <a:endParaRPr lang="zh-CN" altLang="en-US"/>
           </a:p>
@@ -5504,7 +5504,7 @@
             <a:fld id="{C33D8BF3-04B1-4578-9944-A784348B543C}" type="datetimeFigureOut">
               <a:rPr lang="zh-CN" altLang="en-US"/>
               <a:pPr/>
-              <a:t>2020/10/25</a:t>
+              <a:t>2020/11/16</a:t>
             </a:fld>
             <a:endParaRPr lang="zh-CN" altLang="en-US"/>
           </a:p>
@@ -5631,7 +5631,7 @@
             <a:fld id="{C33D8BF3-04B1-4578-9944-A784348B543C}" type="datetimeFigureOut">
               <a:rPr lang="zh-CN" altLang="en-US"/>
               <a:pPr/>
-              <a:t>2020/10/25</a:t>
+              <a:t>2020/11/16</a:t>
             </a:fld>
             <a:endParaRPr lang="zh-CN" altLang="en-US"/>
           </a:p>
@@ -5847,7 +5847,7 @@
             <a:fld id="{C33D8BF3-04B1-4578-9944-A784348B543C}" type="datetimeFigureOut">
               <a:rPr lang="zh-CN" altLang="en-US"/>
               <a:pPr/>
-              <a:t>2020/10/25</a:t>
+              <a:t>2020/11/16</a:t>
             </a:fld>
             <a:endParaRPr lang="zh-CN" altLang="en-US"/>
           </a:p>
@@ -6069,7 +6069,7 @@
             <a:fld id="{C33D8BF3-04B1-4578-9944-A784348B543C}" type="datetimeFigureOut">
               <a:rPr lang="zh-CN" altLang="en-US"/>
               <a:pPr/>
-              <a:t>2020/10/25</a:t>
+              <a:t>2020/11/16</a:t>
             </a:fld>
             <a:endParaRPr lang="zh-CN" altLang="en-US"/>
           </a:p>
@@ -6479,7 +6479,7 @@
             <a:fld id="{C33D8BF3-04B1-4578-9944-A784348B543C}" type="datetimeFigureOut">
               <a:rPr lang="zh-CN" altLang="en-US"/>
               <a:pPr/>
-              <a:t>2020/10/25</a:t>
+              <a:t>2020/11/16</a:t>
             </a:fld>
             <a:endParaRPr lang="zh-CN" altLang="en-US"/>
           </a:p>
@@ -7188,38 +7188,23 @@
         </p:nvSpPr>
         <p:spPr bwMode="auto">
           <a:xfrm>
-            <a:off x="3776663" y="2143125"/>
-            <a:ext cx="2881312" cy="2006600"/>
+            <a:off x="3776662" y="2143125"/>
+            <a:ext cx="5115637" cy="2006600"/>
           </a:xfrm>
           <a:prstGeom prst="rect">
             <a:avLst/>
           </a:prstGeom>
-          <a:noFill/>
+          <a:solidFill>
+            <a:schemeClr val="bg1">
+              <a:lumMod val="95000"/>
+            </a:schemeClr>
+          </a:solidFill>
           <a:ln>
             <a:noFill/>
           </a:ln>
-          <a:extLst>
-            <a:ext uri="{909E8E84-426E-40DD-AFC4-6F175D3DCCD1}">
-              <a14:hiddenFill xmlns:a14="http://schemas.microsoft.com/office/drawing/2010/main">
-                <a:solidFill>
-                  <a:srgbClr val="FFFFFF"/>
-                </a:solidFill>
-              </a14:hiddenFill>
-            </a:ext>
-            <a:ext uri="{91240B29-F687-4F45-9708-019B960494DF}">
-              <a14:hiddenLine xmlns:a14="http://schemas.microsoft.com/office/drawing/2010/main" w="9525">
-                <a:solidFill>
-                  <a:srgbClr val="000000"/>
-                </a:solidFill>
-                <a:miter lim="800000"/>
-                <a:headEnd/>
-                <a:tailEnd/>
-              </a14:hiddenLine>
-            </a:ext>
-          </a:extLst>
         </p:spPr>
         <p:txBody>
-          <a:bodyPr wrap="none" lIns="68580" tIns="34290" rIns="68580" bIns="34290">
+          <a:bodyPr wrap="square" lIns="68580" tIns="34290" rIns="68580" bIns="34290">
             <a:spAutoFit/>
           </a:bodyPr>
           <a:lstStyle>
@@ -7342,11 +7327,11 @@
               <a:buChar char="p"/>
             </a:pPr>
             <a:r>
-              <a:rPr lang="en-US" altLang="zh-CN" sz="1400"/>
+              <a:rPr lang="en-US" altLang="zh-CN" sz="1400" dirty="0"/>
               <a:t>1 </a:t>
             </a:r>
             <a:r>
-              <a:rPr lang="zh-CN" altLang="en-US" sz="1400"/>
+              <a:rPr lang="zh-CN" altLang="en-US" sz="1400" dirty="0"/>
               <a:t>定义</a:t>
             </a:r>
           </a:p>
@@ -7359,11 +7344,11 @@
               <a:buChar char="p"/>
             </a:pPr>
             <a:r>
-              <a:rPr lang="en-US" altLang="zh-CN" sz="1400"/>
+              <a:rPr lang="en-US" altLang="zh-CN" sz="1400" dirty="0"/>
               <a:t>2 </a:t>
             </a:r>
             <a:r>
-              <a:rPr lang="zh-CN" altLang="en-US" sz="1400"/>
+              <a:rPr lang="zh-CN" altLang="en-US" sz="1400" dirty="0"/>
               <a:t>分类</a:t>
             </a:r>
           </a:p>
@@ -7376,11 +7361,11 @@
               <a:buChar char="p"/>
             </a:pPr>
             <a:r>
-              <a:rPr lang="en-US" altLang="zh-CN" sz="1400"/>
+              <a:rPr lang="en-US" altLang="zh-CN" sz="1400" dirty="0"/>
               <a:t>3 </a:t>
             </a:r>
             <a:r>
-              <a:rPr lang="zh-CN" altLang="en-US" sz="1400"/>
+              <a:rPr lang="zh-CN" altLang="en-US" sz="1400" dirty="0"/>
               <a:t>两种启动方法</a:t>
             </a:r>
           </a:p>
@@ -7393,11 +7378,11 @@
               <a:buChar char="p"/>
             </a:pPr>
             <a:r>
-              <a:rPr lang="en-US" altLang="zh-CN" sz="1400"/>
+              <a:rPr lang="en-US" altLang="zh-CN" sz="1400" dirty="0"/>
               <a:t>4 </a:t>
             </a:r>
             <a:r>
-              <a:rPr lang="zh-CN" altLang="en-US" sz="1400"/>
+              <a:rPr lang="zh-CN" altLang="en-US" sz="1400" dirty="0"/>
               <a:t>生命周期</a:t>
             </a:r>
           </a:p>
@@ -7410,11 +7395,11 @@
               <a:buChar char="p"/>
             </a:pPr>
             <a:r>
-              <a:rPr lang="en-US" altLang="zh-CN" sz="1400"/>
+              <a:rPr lang="en-US" altLang="zh-CN" sz="1400" dirty="0"/>
               <a:t>5 </a:t>
             </a:r>
             <a:r>
-              <a:rPr lang="zh-CN" altLang="en-US" sz="1400"/>
+              <a:rPr lang="zh-CN" altLang="en-US" sz="1400" dirty="0"/>
               <a:t>基本用法</a:t>
             </a:r>
           </a:p>
@@ -7427,11 +7412,11 @@
               <a:buChar char="p"/>
             </a:pPr>
             <a:r>
-              <a:rPr lang="en-US" altLang="zh-CN" sz="1400"/>
+              <a:rPr lang="en-US" altLang="zh-CN" sz="1400" dirty="0"/>
               <a:t>6 </a:t>
             </a:r>
             <a:r>
-              <a:rPr lang="zh-CN" altLang="en-US" sz="1400"/>
+              <a:rPr lang="zh-CN" altLang="en-US" sz="1400" dirty="0"/>
               <a:t>音乐播放器实例		</a:t>
             </a:r>
           </a:p>
@@ -7503,8 +7488,8 @@
         </p:nvSpPr>
         <p:spPr>
           <a:xfrm>
-            <a:off x="3608388" y="4329113"/>
-            <a:ext cx="5319712" cy="201612"/>
+            <a:off x="3776662" y="4329113"/>
+            <a:ext cx="5151438" cy="201612"/>
           </a:xfrm>
           <a:prstGeom prst="rect">
             <a:avLst/>
@@ -7964,7 +7949,7 @@
     </p:tnLst>
     <p:bldLst>
       <p:bldP spid="2" grpId="0" bldLvl="0" animBg="1"/>
-      <p:bldP spid="5" grpId="0"/>
+      <p:bldP spid="5" grpId="0" animBg="1"/>
       <p:bldP spid="10" grpId="0" bldLvl="0" animBg="1"/>
       <p:bldP spid="11" grpId="0" bldLvl="0" animBg="1"/>
     </p:bldLst>
@@ -8042,6 +8027,11 @@
             <a:off x="385763" y="882650"/>
             <a:ext cx="3354387" cy="3663950"/>
           </a:xfrm>
+          <a:solidFill>
+            <a:schemeClr val="bg1">
+              <a:lumMod val="95000"/>
+            </a:schemeClr>
+          </a:solidFill>
         </p:spPr>
         <p:txBody>
           <a:bodyPr>
@@ -8049,7 +8039,9 @@
           </a:bodyPr>
           <a:lstStyle/>
           <a:p>
-            <a:pPr fontAlgn="auto"/>
+            <a:pPr marL="0" indent="0" fontAlgn="auto">
+              <a:buNone/>
+            </a:pPr>
             <a:r>
               <a:rPr lang="en-US" altLang="zh-CN" noProof="1"/>
               <a:t>1 </a:t>
@@ -8065,11 +8057,11 @@
               <a:buNone/>
             </a:pPr>
             <a:r>
-              <a:rPr lang="zh-CN" altLang="en-US" noProof="1"/>
+              <a:rPr lang="zh-CN" altLang="en-US" sz="1200" noProof="1"/>
               <a:t>教材</a:t>
             </a:r>
             <a:r>
-              <a:rPr lang="en-US" altLang="zh-CN" noProof="1"/>
+              <a:rPr lang="en-US" altLang="zh-CN" sz="1200" noProof="1"/>
               <a:t>P118</a:t>
             </a:r>
           </a:p>
@@ -8078,7 +8070,9 @@
             <a:endParaRPr lang="en-US" altLang="zh-CN" noProof="1"/>
           </a:p>
           <a:p>
-            <a:pPr fontAlgn="auto"/>
+            <a:pPr marL="0" indent="0" fontAlgn="auto">
+              <a:buNone/>
+            </a:pPr>
             <a:r>
               <a:rPr lang="en-US" altLang="zh-CN" noProof="1"/>
               <a:t>2 </a:t>
@@ -8094,11 +8088,11 @@
               <a:buNone/>
             </a:pPr>
             <a:r>
-              <a:rPr lang="zh-CN" altLang="en-US" noProof="1"/>
+              <a:rPr lang="zh-CN" altLang="en-US" sz="1200" noProof="1"/>
               <a:t>教材</a:t>
             </a:r>
             <a:r>
-              <a:rPr lang="en-US" altLang="zh-CN" noProof="1"/>
+              <a:rPr lang="en-US" altLang="zh-CN" sz="1200" noProof="1"/>
               <a:t>P123</a:t>
             </a:r>
           </a:p>
@@ -9356,7 +9350,7 @@
             <a:r>
               <a:rPr lang="en-US" altLang="zh-CN" sz="2800" b="1" noProof="1">
                 <a:solidFill>
-                  <a:srgbClr val="00B050"/>
+                  <a:srgbClr val="002060"/>
                 </a:solidFill>
                 <a:latin typeface="微软雅黑" panose="020B0503020204020204" pitchFamily="34" charset="-122"/>
                 <a:ea typeface="微软雅黑" panose="020B0503020204020204" pitchFamily="34" charset="-122"/>
@@ -9902,7 +9896,7 @@
         <p:spPr bwMode="auto">
           <a:xfrm>
             <a:off x="411163" y="877888"/>
-            <a:ext cx="8412162" cy="3989387"/>
+            <a:ext cx="8412162" cy="3673698"/>
           </a:xfrm>
           <a:prstGeom prst="rect">
             <a:avLst/>
@@ -9931,7 +9925,7 @@
             <a:r>
               <a:rPr lang="zh-CN" altLang="zh-CN" sz="2400" dirty="0">
                 <a:solidFill>
-                  <a:srgbClr val="00B050"/>
+                  <a:srgbClr val="002060"/>
                 </a:solidFill>
                 <a:latin typeface="微软雅黑" panose="020B0503020204020204" pitchFamily="34" charset="-122"/>
                 <a:ea typeface="微软雅黑" panose="020B0503020204020204" pitchFamily="34" charset="-122"/>
@@ -9942,7 +9936,7 @@
             <a:r>
               <a:rPr lang="zh-CN" altLang="zh-CN" sz="2400" dirty="0">
                 <a:solidFill>
-                  <a:srgbClr val="00B050"/>
+                  <a:srgbClr val="002060"/>
                 </a:solidFill>
                 <a:latin typeface="微软雅黑" panose="020B0503020204020204" pitchFamily="34" charset="-122"/>
                 <a:ea typeface="微软雅黑" panose="020B0503020204020204" pitchFamily="34" charset="-122"/>
@@ -9953,12 +9947,25 @@
             <a:r>
               <a:rPr lang="zh-CN" altLang="zh-CN" sz="2400" dirty="0">
                 <a:solidFill>
-                  <a:srgbClr val="00B050"/>
+                  <a:srgbClr val="002060"/>
                 </a:solidFill>
                 <a:latin typeface="微软雅黑" panose="020B0503020204020204" pitchFamily="34" charset="-122"/>
                 <a:ea typeface="微软雅黑" panose="020B0503020204020204" pitchFamily="34" charset="-122"/>
               </a:rPr>
-              <a:t>用于应用程序内部</a:t>
+              <a:t>用于应用程序</a:t>
+            </a:r>
+            <a:r>
+              <a:rPr lang="zh-CN" altLang="zh-CN" sz="2400" dirty="0">
+                <a:solidFill>
+                  <a:srgbClr val="002060"/>
+                </a:solidFill>
+                <a:highlight>
+                  <a:srgbClr val="FFFF00"/>
+                </a:highlight>
+                <a:latin typeface="微软雅黑" panose="020B0503020204020204" pitchFamily="34" charset="-122"/>
+                <a:ea typeface="微软雅黑" panose="020B0503020204020204" pitchFamily="34" charset="-122"/>
+              </a:rPr>
+              <a:t>内部</a:t>
             </a:r>
           </a:p>
           <a:p>
@@ -9976,7 +9983,7 @@
                 <a:latin typeface="微软雅黑" panose="020B0503020204020204" pitchFamily="34" charset="-122"/>
                 <a:ea typeface="微软雅黑" panose="020B0503020204020204" pitchFamily="34" charset="-122"/>
               </a:rPr>
-              <a:t>可以实现应用程序自己的一些耗时任务</a:t>
+              <a:t>实现应用程序自己的一些耗时任务</a:t>
             </a:r>
           </a:p>
           <a:p>
@@ -10048,35 +10055,35 @@
             <a:r>
               <a:rPr lang="zh-CN" altLang="zh-CN" sz="2400" dirty="0">
                 <a:solidFill>
-                  <a:srgbClr val="00B050"/>
+                  <a:srgbClr val="002060"/>
                 </a:solidFill>
                 <a:latin typeface="微软雅黑" panose="020B0503020204020204" pitchFamily="34" charset="-122"/>
                 <a:ea typeface="微软雅黑" panose="020B0503020204020204" pitchFamily="34" charset="-122"/>
                 <a:sym typeface="+mn-ea"/>
               </a:rPr>
-              <a:t>远程服务（Remote Service）：用于应用程序之间</a:t>
+              <a:t>远程服务（Remote Service）：用于应用程序</a:t>
+            </a:r>
+            <a:r>
+              <a:rPr lang="zh-CN" altLang="zh-CN" sz="2400" dirty="0">
+                <a:solidFill>
+                  <a:srgbClr val="002060"/>
+                </a:solidFill>
+                <a:highlight>
+                  <a:srgbClr val="FFFF00"/>
+                </a:highlight>
+                <a:latin typeface="微软雅黑" panose="020B0503020204020204" pitchFamily="34" charset="-122"/>
+                <a:ea typeface="微软雅黑" panose="020B0503020204020204" pitchFamily="34" charset="-122"/>
+                <a:sym typeface="+mn-ea"/>
+              </a:rPr>
+              <a:t>之间</a:t>
             </a:r>
             <a:endParaRPr lang="zh-CN" altLang="zh-CN" sz="1400" dirty="0">
               <a:solidFill>
-                <a:srgbClr val="000000"/>
+                <a:srgbClr val="002060"/>
               </a:solidFill>
-              <a:latin typeface="微软雅黑" panose="020B0503020204020204" pitchFamily="34" charset="-122"/>
-              <a:ea typeface="微软雅黑" panose="020B0503020204020204" pitchFamily="34" charset="-122"/>
-            </a:endParaRPr>
-          </a:p>
-          <a:p>
-            <a:pPr indent="360680" eaLnBrk="0" hangingPunct="0">
-              <a:lnSpc>
-                <a:spcPct val="130000"/>
-              </a:lnSpc>
-              <a:buFont typeface="Wingdings" panose="05000000000000000000" pitchFamily="2" charset="2"/>
-              <a:buNone/>
-              <a:defRPr/>
-            </a:pPr>
-            <a:endParaRPr lang="zh-CN" altLang="zh-CN" sz="1400" dirty="0">
-              <a:solidFill>
-                <a:srgbClr val="000000"/>
-              </a:solidFill>
+              <a:highlight>
+                <a:srgbClr val="FFFF00"/>
+              </a:highlight>
               <a:latin typeface="微软雅黑" panose="020B0503020204020204" pitchFamily="34" charset="-122"/>
               <a:ea typeface="微软雅黑" panose="020B0503020204020204" pitchFamily="34" charset="-122"/>
             </a:endParaRPr>
@@ -12268,7 +12275,7 @@
         </p:nvSpPr>
         <p:spPr bwMode="auto">
           <a:xfrm>
-            <a:off x="723900" y="936625"/>
+            <a:off x="827740" y="1347665"/>
             <a:ext cx="4424140" cy="1477328"/>
           </a:xfrm>
           <a:prstGeom prst="rect">
@@ -12453,7 +12460,7 @@
         <p:spPr bwMode="auto">
           <a:xfrm>
             <a:off x="165100" y="4613275"/>
-            <a:ext cx="3519488" cy="336550"/>
+            <a:ext cx="2276585" cy="246221"/>
           </a:xfrm>
           <a:prstGeom prst="rect">
             <a:avLst/>
@@ -12599,7 +12606,7 @@
           </a:lstStyle>
           <a:p>
             <a:r>
-              <a:rPr lang="zh-CN" altLang="en-US" sz="1600" b="1">
+              <a:rPr lang="zh-CN" altLang="en-US" sz="1000" b="1">
                 <a:solidFill>
                   <a:srgbClr val="0070C0"/>
                 </a:solidFill>
@@ -12607,7 +12614,7 @@
               <a:t>参考教学参考书《第一行代码》</a:t>
             </a:r>
             <a:r>
-              <a:rPr lang="en-US" altLang="zh-CN" sz="1600" b="1">
+              <a:rPr lang="en-US" altLang="zh-CN" sz="1000" b="1">
                 <a:solidFill>
                   <a:srgbClr val="0070C0"/>
                 </a:solidFill>
@@ -12852,12 +12859,12 @@
               <a:buNone/>
             </a:pPr>
             <a:r>
-              <a:rPr lang="en-US" altLang="zh-CN" sz="1000" b="1"/>
+              <a:rPr lang="en-US" altLang="zh-CN" sz="1000" b="1" dirty="0"/>
               <a:t>Nexus</a:t>
             </a:r>
             <a:r>
-              <a:rPr lang="zh-CN" altLang="en-US" sz="1000" b="1"/>
-              <a:t>模拟器进入开发者选项</a:t>
+              <a:rPr lang="zh-CN" altLang="en-US" sz="1000" b="1" dirty="0"/>
+              <a:t>模拟器进入开发者选项：</a:t>
             </a:r>
           </a:p>
           <a:p>
@@ -12866,7 +12873,7 @@
               <a:buNone/>
             </a:pPr>
             <a:r>
-              <a:rPr lang="zh-CN" altLang="en-US" sz="1000" b="1"/>
+              <a:rPr lang="zh-CN" altLang="en-US" sz="1000" b="1" dirty="0"/>
               <a:t>“Settings”—“About”（设置——关于）菜单 </a:t>
             </a:r>
           </a:p>
@@ -12876,7 +12883,7 @@
               <a:buNone/>
             </a:pPr>
             <a:r>
-              <a:rPr lang="zh-CN" altLang="en-US" sz="1000" b="1"/>
+              <a:rPr lang="zh-CN" altLang="en-US" sz="1000" b="1" dirty="0"/>
               <a:t>向下滚动到底部的Build number（版本号） </a:t>
             </a:r>
           </a:p>
@@ -12886,7 +12893,7 @@
               <a:buNone/>
             </a:pPr>
             <a:r>
-              <a:rPr lang="zh-CN" altLang="en-US" sz="1000" b="1"/>
+              <a:rPr lang="zh-CN" altLang="en-US" sz="1000" b="1" dirty="0"/>
               <a:t>点击Build number（版本号）7次 </a:t>
             </a:r>
           </a:p>
@@ -12895,7 +12902,7 @@
               <a:buFont typeface="Wingdings" panose="05000000000000000000" pitchFamily="2" charset="2"/>
               <a:buNone/>
             </a:pPr>
-            <a:endParaRPr lang="zh-CN" altLang="en-US"/>
+            <a:endParaRPr lang="zh-CN" altLang="en-US" dirty="0"/>
           </a:p>
         </p:txBody>
       </p:sp>

</xml_diff>